<commit_message>
13 Sep 2023 Selenium POM
</commit_message>
<xml_diff>
--- a/Materials/TestNG.pptx
+++ b/Materials/TestNG.pptx
@@ -270,7 +270,7 @@
           <a:p>
             <a:fld id="{474FEC44-FE25-432A-B7F6-7BDB637AC3B5}" type="datetimeFigureOut">
               <a:rPr lang="en-IN" smtClean="0"/>
-              <a:t>04-11-2022</a:t>
+              <a:t>12-09-2023</a:t>
             </a:fld>
             <a:endParaRPr lang="en-IN"/>
           </a:p>
@@ -470,7 +470,7 @@
           <a:p>
             <a:fld id="{474FEC44-FE25-432A-B7F6-7BDB637AC3B5}" type="datetimeFigureOut">
               <a:rPr lang="en-IN" smtClean="0"/>
-              <a:t>04-11-2022</a:t>
+              <a:t>12-09-2023</a:t>
             </a:fld>
             <a:endParaRPr lang="en-IN"/>
           </a:p>
@@ -680,7 +680,7 @@
           <a:p>
             <a:fld id="{474FEC44-FE25-432A-B7F6-7BDB637AC3B5}" type="datetimeFigureOut">
               <a:rPr lang="en-IN" smtClean="0"/>
-              <a:t>04-11-2022</a:t>
+              <a:t>12-09-2023</a:t>
             </a:fld>
             <a:endParaRPr lang="en-IN"/>
           </a:p>
@@ -880,7 +880,7 @@
           <a:p>
             <a:fld id="{474FEC44-FE25-432A-B7F6-7BDB637AC3B5}" type="datetimeFigureOut">
               <a:rPr lang="en-IN" smtClean="0"/>
-              <a:t>04-11-2022</a:t>
+              <a:t>12-09-2023</a:t>
             </a:fld>
             <a:endParaRPr lang="en-IN"/>
           </a:p>
@@ -1156,7 +1156,7 @@
           <a:p>
             <a:fld id="{474FEC44-FE25-432A-B7F6-7BDB637AC3B5}" type="datetimeFigureOut">
               <a:rPr lang="en-IN" smtClean="0"/>
-              <a:t>04-11-2022</a:t>
+              <a:t>12-09-2023</a:t>
             </a:fld>
             <a:endParaRPr lang="en-IN"/>
           </a:p>
@@ -1424,7 +1424,7 @@
           <a:p>
             <a:fld id="{474FEC44-FE25-432A-B7F6-7BDB637AC3B5}" type="datetimeFigureOut">
               <a:rPr lang="en-IN" smtClean="0"/>
-              <a:t>04-11-2022</a:t>
+              <a:t>12-09-2023</a:t>
             </a:fld>
             <a:endParaRPr lang="en-IN"/>
           </a:p>
@@ -1839,7 +1839,7 @@
           <a:p>
             <a:fld id="{474FEC44-FE25-432A-B7F6-7BDB637AC3B5}" type="datetimeFigureOut">
               <a:rPr lang="en-IN" smtClean="0"/>
-              <a:t>04-11-2022</a:t>
+              <a:t>12-09-2023</a:t>
             </a:fld>
             <a:endParaRPr lang="en-IN"/>
           </a:p>
@@ -1981,7 +1981,7 @@
           <a:p>
             <a:fld id="{474FEC44-FE25-432A-B7F6-7BDB637AC3B5}" type="datetimeFigureOut">
               <a:rPr lang="en-IN" smtClean="0"/>
-              <a:t>04-11-2022</a:t>
+              <a:t>12-09-2023</a:t>
             </a:fld>
             <a:endParaRPr lang="en-IN"/>
           </a:p>
@@ -2094,7 +2094,7 @@
           <a:p>
             <a:fld id="{474FEC44-FE25-432A-B7F6-7BDB637AC3B5}" type="datetimeFigureOut">
               <a:rPr lang="en-IN" smtClean="0"/>
-              <a:t>04-11-2022</a:t>
+              <a:t>12-09-2023</a:t>
             </a:fld>
             <a:endParaRPr lang="en-IN"/>
           </a:p>
@@ -2407,7 +2407,7 @@
           <a:p>
             <a:fld id="{474FEC44-FE25-432A-B7F6-7BDB637AC3B5}" type="datetimeFigureOut">
               <a:rPr lang="en-IN" smtClean="0"/>
-              <a:t>04-11-2022</a:t>
+              <a:t>12-09-2023</a:t>
             </a:fld>
             <a:endParaRPr lang="en-IN"/>
           </a:p>
@@ -2696,7 +2696,7 @@
           <a:p>
             <a:fld id="{474FEC44-FE25-432A-B7F6-7BDB637AC3B5}" type="datetimeFigureOut">
               <a:rPr lang="en-IN" smtClean="0"/>
-              <a:t>04-11-2022</a:t>
+              <a:t>12-09-2023</a:t>
             </a:fld>
             <a:endParaRPr lang="en-IN"/>
           </a:p>
@@ -2939,7 +2939,7 @@
           <a:p>
             <a:fld id="{474FEC44-FE25-432A-B7F6-7BDB637AC3B5}" type="datetimeFigureOut">
               <a:rPr lang="en-IN" smtClean="0"/>
-              <a:t>04-11-2022</a:t>
+              <a:t>12-09-2023</a:t>
             </a:fld>
             <a:endParaRPr lang="en-IN"/>
           </a:p>
@@ -5795,15 +5795,7 @@
           <a:p>
             <a:r>
               <a:rPr lang="en-IN" dirty="0"/>
-              <a:t>Add necessary </a:t>
-            </a:r>
-            <a:r>
-              <a:rPr lang="en-IN"/>
-              <a:t>dependencies in </a:t>
-            </a:r>
-            <a:r>
-              <a:rPr lang="en-IN" dirty="0"/>
-              <a:t>pom.xml</a:t>
+              <a:t>Add necessary dependencies in pom.xml</a:t>
             </a:r>
           </a:p>
           <a:p>
@@ -6110,10 +6102,19 @@
                 </a:solidFill>
                 <a:latin typeface="Arial" panose="020B0604020202020204" pitchFamily="34" charset="0"/>
               </a:rPr>
-              <a:t>” package. We use it when a test has to stop immediately after the assertion</a:t>
-            </a:r>
-            <a:r>
-              <a:rPr lang="en-IN" sz="2000" b="1" dirty="0">
+              <a:t>” package. We use it when a test has to stop immediately after </a:t>
+            </a:r>
+            <a:r>
+              <a:rPr lang="en-US" sz="2000">
+                <a:solidFill>
+                  <a:srgbClr val="4D4D4D"/>
+                </a:solidFill>
+                <a:latin typeface="Arial" panose="020B0604020202020204" pitchFamily="34" charset="0"/>
+              </a:rPr>
+              <a:t>the </a:t>
+            </a:r>
+            <a:r>
+              <a:rPr lang="en-IN" sz="2000" b="1">
                 <a:solidFill>
                   <a:srgbClr val="4D4D4D"/>
                 </a:solidFill>
@@ -6139,7 +6140,7 @@
           </a:p>
           <a:p>
             <a:r>
-              <a:rPr lang="en-IN" sz="2000" b="1">
+              <a:rPr lang="en-IN" sz="2000" b="1" dirty="0">
                 <a:solidFill>
                   <a:srgbClr val="4D4D4D"/>
                 </a:solidFill>
@@ -6148,22 +6149,13 @@
               <a:t>Soft Assertion : </a:t>
             </a:r>
             <a:r>
-              <a:rPr lang="en-US" sz="2000">
+              <a:rPr lang="en-US" sz="2000" dirty="0">
                 <a:solidFill>
                   <a:srgbClr val="4D4D4D"/>
                 </a:solidFill>
                 <a:latin typeface="Arial" panose="020B0604020202020204" pitchFamily="34" charset="0"/>
               </a:rPr>
-              <a:t>It </a:t>
-            </a:r>
-            <a:r>
-              <a:rPr lang="en-US" sz="2000" dirty="0">
-                <a:solidFill>
-                  <a:srgbClr val="4D4D4D"/>
-                </a:solidFill>
-                <a:latin typeface="Arial" panose="020B0604020202020204" pitchFamily="34" charset="0"/>
-              </a:rPr>
-              <a:t>is a custom assert mechanism supported by TestNG’s </a:t>
+              <a:t>It is a custom assert mechanism supported by TestNG’s </a:t>
             </a:r>
             <a:r>
               <a:rPr lang="en-US" sz="2000" dirty="0" err="1">

</xml_diff>